<commit_message>
Updated some images of GUI
</commit_message>
<xml_diff>
--- a/doc/diagrams/diagrams.pptx
+++ b/doc/diagrams/diagrams.pptx
@@ -194,7 +194,7 @@
           <a:p>
             <a:fld id="{7881B180-FEA7-44BF-8A99-7582820B27D2}" type="datetimeFigureOut">
               <a:rPr lang="en-SG" smtClean="0"/>
-              <a:t>15/10/2012</a:t>
+              <a:t>25/10/2012</a:t>
             </a:fld>
             <a:endParaRPr lang="en-SG"/>
           </a:p>
@@ -727,7 +727,7 @@
           <a:p>
             <a:fld id="{6145E44A-13A4-430F-A4E2-3756057D0827}" type="datetimeFigureOut">
               <a:rPr lang="en-SG" smtClean="0"/>
-              <a:t>15/10/2012</a:t>
+              <a:t>25/10/2012</a:t>
             </a:fld>
             <a:endParaRPr lang="en-SG"/>
           </a:p>
@@ -897,7 +897,7 @@
           <a:p>
             <a:fld id="{6145E44A-13A4-430F-A4E2-3756057D0827}" type="datetimeFigureOut">
               <a:rPr lang="en-SG" smtClean="0"/>
-              <a:t>15/10/2012</a:t>
+              <a:t>25/10/2012</a:t>
             </a:fld>
             <a:endParaRPr lang="en-SG"/>
           </a:p>
@@ -1077,7 +1077,7 @@
           <a:p>
             <a:fld id="{6145E44A-13A4-430F-A4E2-3756057D0827}" type="datetimeFigureOut">
               <a:rPr lang="en-SG" smtClean="0"/>
-              <a:t>15/10/2012</a:t>
+              <a:t>25/10/2012</a:t>
             </a:fld>
             <a:endParaRPr lang="en-SG"/>
           </a:p>
@@ -1247,7 +1247,7 @@
           <a:p>
             <a:fld id="{6145E44A-13A4-430F-A4E2-3756057D0827}" type="datetimeFigureOut">
               <a:rPr lang="en-SG" smtClean="0"/>
-              <a:t>15/10/2012</a:t>
+              <a:t>25/10/2012</a:t>
             </a:fld>
             <a:endParaRPr lang="en-SG"/>
           </a:p>
@@ -1493,7 +1493,7 @@
           <a:p>
             <a:fld id="{6145E44A-13A4-430F-A4E2-3756057D0827}" type="datetimeFigureOut">
               <a:rPr lang="en-SG" smtClean="0"/>
-              <a:t>15/10/2012</a:t>
+              <a:t>25/10/2012</a:t>
             </a:fld>
             <a:endParaRPr lang="en-SG"/>
           </a:p>
@@ -1781,7 +1781,7 @@
           <a:p>
             <a:fld id="{6145E44A-13A4-430F-A4E2-3756057D0827}" type="datetimeFigureOut">
               <a:rPr lang="en-SG" smtClean="0"/>
-              <a:t>15/10/2012</a:t>
+              <a:t>25/10/2012</a:t>
             </a:fld>
             <a:endParaRPr lang="en-SG"/>
           </a:p>
@@ -2203,7 +2203,7 @@
           <a:p>
             <a:fld id="{6145E44A-13A4-430F-A4E2-3756057D0827}" type="datetimeFigureOut">
               <a:rPr lang="en-SG" smtClean="0"/>
-              <a:t>15/10/2012</a:t>
+              <a:t>25/10/2012</a:t>
             </a:fld>
             <a:endParaRPr lang="en-SG"/>
           </a:p>
@@ -2321,7 +2321,7 @@
           <a:p>
             <a:fld id="{6145E44A-13A4-430F-A4E2-3756057D0827}" type="datetimeFigureOut">
               <a:rPr lang="en-SG" smtClean="0"/>
-              <a:t>15/10/2012</a:t>
+              <a:t>25/10/2012</a:t>
             </a:fld>
             <a:endParaRPr lang="en-SG"/>
           </a:p>
@@ -2416,7 +2416,7 @@
           <a:p>
             <a:fld id="{6145E44A-13A4-430F-A4E2-3756057D0827}" type="datetimeFigureOut">
               <a:rPr lang="en-SG" smtClean="0"/>
-              <a:t>15/10/2012</a:t>
+              <a:t>25/10/2012</a:t>
             </a:fld>
             <a:endParaRPr lang="en-SG"/>
           </a:p>
@@ -2693,7 +2693,7 @@
           <a:p>
             <a:fld id="{6145E44A-13A4-430F-A4E2-3756057D0827}" type="datetimeFigureOut">
               <a:rPr lang="en-SG" smtClean="0"/>
-              <a:t>15/10/2012</a:t>
+              <a:t>25/10/2012</a:t>
             </a:fld>
             <a:endParaRPr lang="en-SG"/>
           </a:p>
@@ -2946,7 +2946,7 @@
           <a:p>
             <a:fld id="{6145E44A-13A4-430F-A4E2-3756057D0827}" type="datetimeFigureOut">
               <a:rPr lang="en-SG" smtClean="0"/>
-              <a:t>15/10/2012</a:t>
+              <a:t>25/10/2012</a:t>
             </a:fld>
             <a:endParaRPr lang="en-SG"/>
           </a:p>
@@ -3159,7 +3159,7 @@
           <a:p>
             <a:fld id="{6145E44A-13A4-430F-A4E2-3756057D0827}" type="datetimeFigureOut">
               <a:rPr lang="en-SG" smtClean="0"/>
-              <a:t>15/10/2012</a:t>
+              <a:t>25/10/2012</a:t>
             </a:fld>
             <a:endParaRPr lang="en-SG"/>
           </a:p>
@@ -3536,29 +3536,62 @@
       </p:grpSpPr>
       <p:pic>
         <p:nvPicPr>
-          <p:cNvPr id="6" name="Picture 5"/>
-          <p:cNvPicPr/>
+          <p:cNvPr id="1027" name="Picture 3"/>
+          <p:cNvPicPr>
+            <a:picLocks noChangeAspect="1" noChangeArrowheads="1"/>
+          </p:cNvPicPr>
           <p:nvPr/>
         </p:nvPicPr>
         <p:blipFill rotWithShape="1">
-          <a:blip r:embed="rId2"/>
-          <a:srcRect l="31731" t="36666" r="32532" b="22051"/>
+          <a:blip r:embed="rId2">
+            <a:extLst>
+              <a:ext uri="{28A0092B-C50C-407E-A947-70E740481C1C}">
+                <a14:useLocalDpi xmlns:a14="http://schemas.microsoft.com/office/drawing/2010/main" val="0"/>
+              </a:ext>
+            </a:extLst>
+          </a:blip>
+          <a:srcRect l="36759" t="27806" r="36290" b="39795"/>
           <a:stretch/>
         </p:blipFill>
         <p:spPr bwMode="auto">
           <a:xfrm>
-            <a:off x="1884762" y="1628800"/>
-            <a:ext cx="5501005" cy="3971290"/>
+            <a:off x="1979712" y="1711526"/>
+            <a:ext cx="4990866" cy="3749907"/>
           </a:xfrm>
           <a:prstGeom prst="rect">
             <a:avLst/>
           </a:prstGeom>
+          <a:noFill/>
           <a:ln>
             <a:noFill/>
           </a:ln>
+          <a:effectLst/>
           <a:extLst>
-            <a:ext uri="{53640926-AAD7-44D8-BBD7-CCE9431645EC}">
-              <a14:shadowObscured xmlns:a14="http://schemas.microsoft.com/office/drawing/2010/main"/>
+            <a:ext uri="{909E8E84-426E-40DD-AFC4-6F175D3DCCD1}">
+              <a14:hiddenFill xmlns:a14="http://schemas.microsoft.com/office/drawing/2010/main">
+                <a:solidFill>
+                  <a:schemeClr val="accent1"/>
+                </a:solidFill>
+              </a14:hiddenFill>
+            </a:ext>
+            <a:ext uri="{91240B29-F687-4F45-9708-019B960494DF}">
+              <a14:hiddenLine xmlns:a14="http://schemas.microsoft.com/office/drawing/2010/main" w="9525">
+                <a:solidFill>
+                  <a:schemeClr val="tx1"/>
+                </a:solidFill>
+                <a:miter lim="800000"/>
+                <a:headEnd/>
+                <a:tailEnd/>
+              </a14:hiddenLine>
+            </a:ext>
+            <a:ext uri="{AF507438-7753-43E0-B8FC-AC1667EBCBE1}">
+              <a14:hiddenEffects xmlns:a14="http://schemas.microsoft.com/office/drawing/2010/main">
+                <a:effectLst>
+                  <a:outerShdw dist="35921" dir="2700000" algn="ctr" rotWithShape="0">
+                    <a:schemeClr val="bg2"/>
+                  </a:outerShdw>
+                </a:effectLst>
+              </a14:hiddenEffects>
             </a:ext>
           </a:extLst>
         </p:spPr>
@@ -3571,11 +3604,20 @@
         </p:nvSpPr>
         <p:spPr>
           <a:xfrm>
-            <a:off x="4073399" y="3314616"/>
+            <a:off x="7397460" y="2875311"/>
             <a:ext cx="1542655" cy="711168"/>
           </a:xfrm>
           <a:prstGeom prst="accentCallout3">
-            <a:avLst/>
+            <a:avLst>
+              <a:gd name="adj1" fmla="val 18750"/>
+              <a:gd name="adj2" fmla="val -8333"/>
+              <a:gd name="adj3" fmla="val 18750"/>
+              <a:gd name="adj4" fmla="val -16667"/>
+              <a:gd name="adj5" fmla="val 27076"/>
+              <a:gd name="adj6" fmla="val -60901"/>
+              <a:gd name="adj7" fmla="val 78419"/>
+              <a:gd name="adj8" fmla="val -102995"/>
+            </a:avLst>
           </a:prstGeom>
           <a:solidFill>
             <a:schemeClr val="bg1"/>
@@ -3645,94 +3687,13 @@
       </p:sp>
       <p:sp>
         <p:nvSpPr>
-          <p:cNvPr id="15" name="Line Callout 2 (No Border) 14"/>
-          <p:cNvSpPr/>
-          <p:nvPr/>
-        </p:nvSpPr>
-        <p:spPr>
-          <a:xfrm>
-            <a:off x="7287553" y="1561058"/>
-            <a:ext cx="1466366" cy="859830"/>
-          </a:xfrm>
-          <a:prstGeom prst="callout2">
-            <a:avLst/>
-          </a:prstGeom>
-          <a:solidFill>
-            <a:schemeClr val="bg1"/>
-          </a:solidFill>
-          <a:ln w="12700">
-            <a:solidFill>
-              <a:schemeClr val="tx1"/>
-            </a:solidFill>
-          </a:ln>
-          <a:effectLst/>
-        </p:spPr>
-        <p:style>
-          <a:lnRef idx="2">
-            <a:schemeClr val="accent1">
-              <a:shade val="50000"/>
-            </a:schemeClr>
-          </a:lnRef>
-          <a:fillRef idx="1">
-            <a:schemeClr val="accent1"/>
-          </a:fillRef>
-          <a:effectRef idx="0">
-            <a:schemeClr val="accent1"/>
-          </a:effectRef>
-          <a:fontRef idx="minor">
-            <a:schemeClr val="lt1"/>
-          </a:fontRef>
-        </p:style>
-        <p:txBody>
-          <a:bodyPr rtlCol="0" anchor="ctr"/>
-          <a:lstStyle/>
-          <a:p>
-            <a:pPr algn="ctr"/>
-            <a:r>
-              <a:rPr lang="en-US" sz="1100" u="sng" dirty="0" smtClean="0">
-                <a:solidFill>
-                  <a:schemeClr val="tx1"/>
-                </a:solidFill>
-                <a:effectLst/>
-                <a:latin typeface="Arial" pitchFamily="34" charset="0"/>
-                <a:ea typeface="Calibri"/>
-                <a:cs typeface="Arial" pitchFamily="34" charset="0"/>
-              </a:rPr>
-              <a:t>Font size toggles</a:t>
-            </a:r>
-            <a:r>
-              <a:rPr lang="en-US" sz="1100" dirty="0" smtClean="0">
-                <a:solidFill>
-                  <a:schemeClr val="tx1"/>
-                </a:solidFill>
-                <a:effectLst/>
-                <a:latin typeface="Arial" pitchFamily="34" charset="0"/>
-                <a:ea typeface="Calibri"/>
-                <a:cs typeface="Arial" pitchFamily="34" charset="0"/>
-              </a:rPr>
-              <a:t>: To increase or reduce the font size</a:t>
-            </a:r>
-            <a:endParaRPr lang="en-SG" sz="1100" dirty="0" smtClean="0">
-              <a:solidFill>
-                <a:schemeClr val="tx1"/>
-              </a:solidFill>
-              <a:effectLst/>
-              <a:latin typeface="Arial" pitchFamily="34" charset="0"/>
-              <a:ea typeface="Calibri"/>
-              <a:cs typeface="Arial" pitchFamily="34" charset="0"/>
-            </a:endParaRPr>
-          </a:p>
-        </p:txBody>
-      </p:sp>
-      <p:sp>
-        <p:nvSpPr>
           <p:cNvPr id="17" name="Line Callout 2 (No Border) 16"/>
           <p:cNvSpPr/>
           <p:nvPr/>
         </p:nvSpPr>
         <p:spPr>
           <a:xfrm>
-            <a:off x="4853509" y="5456074"/>
+            <a:off x="4475145" y="5615849"/>
             <a:ext cx="1767501" cy="565214"/>
           </a:xfrm>
           <a:prstGeom prst="callout2">
@@ -3811,7 +3772,7 @@
         </p:nvSpPr>
         <p:spPr>
           <a:xfrm>
-            <a:off x="256975" y="1196752"/>
+            <a:off x="1095961" y="544821"/>
             <a:ext cx="1767501" cy="864096"/>
           </a:xfrm>
           <a:prstGeom prst="callout2">
@@ -3820,8 +3781,8 @@
               <a:gd name="adj2" fmla="val 107842"/>
               <a:gd name="adj3" fmla="val 47132"/>
               <a:gd name="adj4" fmla="val 136720"/>
-              <a:gd name="adj5" fmla="val 104297"/>
-              <a:gd name="adj6" fmla="val 155795"/>
+              <a:gd name="adj5" fmla="val 148521"/>
+              <a:gd name="adj6" fmla="val 161972"/>
             </a:avLst>
           </a:prstGeom>
           <a:solidFill>
@@ -3862,7 +3823,7 @@
                 <a:latin typeface="Arial" pitchFamily="34" charset="0"/>
                 <a:cs typeface="Arial" pitchFamily="34" charset="0"/>
               </a:rPr>
-              <a:t>Settings</a:t>
+              <a:t>Settings/Preferences</a:t>
             </a:r>
             <a:r>
               <a:rPr lang="en-US" sz="1100" dirty="0" smtClean="0">
@@ -3872,7 +3833,17 @@
                 <a:latin typeface="Arial" pitchFamily="34" charset="0"/>
                 <a:cs typeface="Arial" pitchFamily="34" charset="0"/>
               </a:rPr>
-              <a:t>: Where you customize your keyboard shortcuts, command keywords and more</a:t>
+              <a:t>: </a:t>
+            </a:r>
+            <a:r>
+              <a:rPr lang="en-US" sz="1100" dirty="0" smtClean="0">
+                <a:solidFill>
+                  <a:schemeClr val="tx1"/>
+                </a:solidFill>
+                <a:latin typeface="Arial" pitchFamily="34" charset="0"/>
+                <a:cs typeface="Arial" pitchFamily="34" charset="0"/>
+              </a:rPr>
+              <a:t>Where you customize your keyboard shortcuts, command keywords and more</a:t>
             </a:r>
             <a:endParaRPr lang="en-SG" sz="1100" dirty="0">
               <a:solidFill>
@@ -3892,15 +3863,15 @@
         </p:nvSpPr>
         <p:spPr>
           <a:xfrm>
-            <a:off x="4145407" y="976462"/>
+            <a:off x="7085689" y="696620"/>
             <a:ext cx="1637683" cy="724346"/>
           </a:xfrm>
           <a:prstGeom prst="callout2">
             <a:avLst>
-              <a:gd name="adj1" fmla="val 78365"/>
+              <a:gd name="adj1" fmla="val 51987"/>
               <a:gd name="adj2" fmla="val -6766"/>
-              <a:gd name="adj3" fmla="val 79321"/>
-              <a:gd name="adj4" fmla="val -15725"/>
+              <a:gd name="adj3" fmla="val 58595"/>
+              <a:gd name="adj4" fmla="val -20725"/>
               <a:gd name="adj5" fmla="val 157223"/>
               <a:gd name="adj6" fmla="val -25424"/>
             </a:avLst>
@@ -3954,107 +3925,6 @@
                 <a:cs typeface="Arial" pitchFamily="34" charset="0"/>
               </a:rPr>
               <a:t>: Where you can find useful information when you are lost</a:t>
-            </a:r>
-            <a:endParaRPr lang="en-SG" sz="1100" dirty="0">
-              <a:solidFill>
-                <a:schemeClr val="tx1"/>
-              </a:solidFill>
-              <a:latin typeface="Arial" pitchFamily="34" charset="0"/>
-              <a:cs typeface="Arial" pitchFamily="34" charset="0"/>
-            </a:endParaRPr>
-          </a:p>
-        </p:txBody>
-      </p:sp>
-      <p:sp>
-        <p:nvSpPr>
-          <p:cNvPr id="20" name="Line Callout 2 (No Border) 19"/>
-          <p:cNvSpPr/>
-          <p:nvPr/>
-        </p:nvSpPr>
-        <p:spPr>
-          <a:xfrm>
-            <a:off x="217666" y="2780928"/>
-            <a:ext cx="1767501" cy="1008112"/>
-          </a:xfrm>
-          <a:prstGeom prst="callout2">
-            <a:avLst>
-              <a:gd name="adj1" fmla="val 47132"/>
-              <a:gd name="adj2" fmla="val 100706"/>
-              <a:gd name="adj3" fmla="val 47132"/>
-              <a:gd name="adj4" fmla="val 110853"/>
-              <a:gd name="adj5" fmla="val -34887"/>
-              <a:gd name="adj6" fmla="val 127252"/>
-            </a:avLst>
-          </a:prstGeom>
-          <a:solidFill>
-            <a:schemeClr val="bg1"/>
-          </a:solidFill>
-          <a:ln w="12700">
-            <a:solidFill>
-              <a:schemeClr val="tx1"/>
-            </a:solidFill>
-          </a:ln>
-          <a:effectLst/>
-        </p:spPr>
-        <p:style>
-          <a:lnRef idx="2">
-            <a:schemeClr val="accent1">
-              <a:shade val="50000"/>
-            </a:schemeClr>
-          </a:lnRef>
-          <a:fillRef idx="1">
-            <a:schemeClr val="accent1"/>
-          </a:fillRef>
-          <a:effectRef idx="0">
-            <a:schemeClr val="accent1"/>
-          </a:effectRef>
-          <a:fontRef idx="minor">
-            <a:schemeClr val="lt1"/>
-          </a:fontRef>
-        </p:style>
-        <p:txBody>
-          <a:bodyPr rtlCol="0" anchor="ctr"/>
-          <a:lstStyle/>
-          <a:p>
-            <a:r>
-              <a:rPr lang="en-US" sz="1100" u="sng" dirty="0" smtClean="0">
-                <a:solidFill>
-                  <a:schemeClr val="tx1"/>
-                </a:solidFill>
-                <a:latin typeface="Arial" pitchFamily="34" charset="0"/>
-                <a:cs typeface="Arial" pitchFamily="34" charset="0"/>
-              </a:rPr>
-              <a:t>File</a:t>
-            </a:r>
-            <a:r>
-              <a:rPr lang="en-US" sz="1100" dirty="0" smtClean="0">
-                <a:solidFill>
-                  <a:schemeClr val="tx1"/>
-                </a:solidFill>
-                <a:latin typeface="Arial" pitchFamily="34" charset="0"/>
-                <a:cs typeface="Arial" pitchFamily="34" charset="0"/>
-              </a:rPr>
-              <a:t>: Where you can export your tasks list to other file formats and customize your </a:t>
-            </a:r>
-            <a:r>
-              <a:rPr lang="en-US" sz="1100" dirty="0" err="1" smtClean="0">
-                <a:solidFill>
-                  <a:schemeClr val="tx1"/>
-                </a:solidFill>
-                <a:latin typeface="Arial" pitchFamily="34" charset="0"/>
-                <a:cs typeface="Arial" pitchFamily="34" charset="0"/>
-              </a:rPr>
-              <a:t>ToDo</a:t>
-            </a:r>
-            <a:r>
-              <a:rPr lang="en-US" sz="1100" dirty="0" smtClean="0">
-                <a:solidFill>
-                  <a:schemeClr val="tx1"/>
-                </a:solidFill>
-                <a:latin typeface="Arial" pitchFamily="34" charset="0"/>
-                <a:cs typeface="Arial" pitchFamily="34" charset="0"/>
-              </a:rPr>
-              <a:t>++ startup settings</a:t>
             </a:r>
             <a:endParaRPr lang="en-SG" sz="1100" dirty="0">
               <a:solidFill>

</xml_diff>

<commit_message>
documentation; user manual & diagrams
</commit_message>
<xml_diff>
--- a/doc/diagrams/diagrams.pptx
+++ b/doc/diagrams/diagrams.pptx
@@ -5,12 +5,13 @@
     <p:sldMasterId id="2147483648" r:id="rId1"/>
   </p:sldMasterIdLst>
   <p:notesMasterIdLst>
-    <p:notesMasterId r:id="rId5"/>
+    <p:notesMasterId r:id="rId6"/>
   </p:notesMasterIdLst>
   <p:sldIdLst>
-    <p:sldId id="256" r:id="rId2"/>
-    <p:sldId id="257" r:id="rId3"/>
-    <p:sldId id="258" r:id="rId4"/>
+    <p:sldId id="259" r:id="rId2"/>
+    <p:sldId id="256" r:id="rId3"/>
+    <p:sldId id="257" r:id="rId4"/>
+    <p:sldId id="258" r:id="rId5"/>
   </p:sldIdLst>
   <p:sldSz cx="9144000" cy="6858000" type="screen4x3"/>
   <p:notesSz cx="6858000" cy="9144000"/>
@@ -194,7 +195,7 @@
           <a:p>
             <a:fld id="{7881B180-FEA7-44BF-8A99-7582820B27D2}" type="datetimeFigureOut">
               <a:rPr lang="en-SG" smtClean="0"/>
-              <a:t>25/10/2012</a:t>
+              <a:t>10/11/2012</a:t>
             </a:fld>
             <a:endParaRPr lang="en-SG"/>
           </a:p>
@@ -527,7 +528,7 @@
           <a:p>
             <a:fld id="{F7F19E3E-3836-44C9-BEF2-E46FE764AFA1}" type="slidenum">
               <a:rPr lang="en-SG" smtClean="0"/>
-              <a:t>2</a:t>
+              <a:t>3</a:t>
             </a:fld>
             <a:endParaRPr lang="en-SG"/>
           </a:p>
@@ -727,7 +728,7 @@
           <a:p>
             <a:fld id="{6145E44A-13A4-430F-A4E2-3756057D0827}" type="datetimeFigureOut">
               <a:rPr lang="en-SG" smtClean="0"/>
-              <a:t>25/10/2012</a:t>
+              <a:t>10/11/2012</a:t>
             </a:fld>
             <a:endParaRPr lang="en-SG"/>
           </a:p>
@@ -897,7 +898,7 @@
           <a:p>
             <a:fld id="{6145E44A-13A4-430F-A4E2-3756057D0827}" type="datetimeFigureOut">
               <a:rPr lang="en-SG" smtClean="0"/>
-              <a:t>25/10/2012</a:t>
+              <a:t>10/11/2012</a:t>
             </a:fld>
             <a:endParaRPr lang="en-SG"/>
           </a:p>
@@ -1077,7 +1078,7 @@
           <a:p>
             <a:fld id="{6145E44A-13A4-430F-A4E2-3756057D0827}" type="datetimeFigureOut">
               <a:rPr lang="en-SG" smtClean="0"/>
-              <a:t>25/10/2012</a:t>
+              <a:t>10/11/2012</a:t>
             </a:fld>
             <a:endParaRPr lang="en-SG"/>
           </a:p>
@@ -1247,7 +1248,7 @@
           <a:p>
             <a:fld id="{6145E44A-13A4-430F-A4E2-3756057D0827}" type="datetimeFigureOut">
               <a:rPr lang="en-SG" smtClean="0"/>
-              <a:t>25/10/2012</a:t>
+              <a:t>10/11/2012</a:t>
             </a:fld>
             <a:endParaRPr lang="en-SG"/>
           </a:p>
@@ -1493,7 +1494,7 @@
           <a:p>
             <a:fld id="{6145E44A-13A4-430F-A4E2-3756057D0827}" type="datetimeFigureOut">
               <a:rPr lang="en-SG" smtClean="0"/>
-              <a:t>25/10/2012</a:t>
+              <a:t>10/11/2012</a:t>
             </a:fld>
             <a:endParaRPr lang="en-SG"/>
           </a:p>
@@ -1781,7 +1782,7 @@
           <a:p>
             <a:fld id="{6145E44A-13A4-430F-A4E2-3756057D0827}" type="datetimeFigureOut">
               <a:rPr lang="en-SG" smtClean="0"/>
-              <a:t>25/10/2012</a:t>
+              <a:t>10/11/2012</a:t>
             </a:fld>
             <a:endParaRPr lang="en-SG"/>
           </a:p>
@@ -2203,7 +2204,7 @@
           <a:p>
             <a:fld id="{6145E44A-13A4-430F-A4E2-3756057D0827}" type="datetimeFigureOut">
               <a:rPr lang="en-SG" smtClean="0"/>
-              <a:t>25/10/2012</a:t>
+              <a:t>10/11/2012</a:t>
             </a:fld>
             <a:endParaRPr lang="en-SG"/>
           </a:p>
@@ -2321,7 +2322,7 @@
           <a:p>
             <a:fld id="{6145E44A-13A4-430F-A4E2-3756057D0827}" type="datetimeFigureOut">
               <a:rPr lang="en-SG" smtClean="0"/>
-              <a:t>25/10/2012</a:t>
+              <a:t>10/11/2012</a:t>
             </a:fld>
             <a:endParaRPr lang="en-SG"/>
           </a:p>
@@ -2416,7 +2417,7 @@
           <a:p>
             <a:fld id="{6145E44A-13A4-430F-A4E2-3756057D0827}" type="datetimeFigureOut">
               <a:rPr lang="en-SG" smtClean="0"/>
-              <a:t>25/10/2012</a:t>
+              <a:t>10/11/2012</a:t>
             </a:fld>
             <a:endParaRPr lang="en-SG"/>
           </a:p>
@@ -2693,7 +2694,7 @@
           <a:p>
             <a:fld id="{6145E44A-13A4-430F-A4E2-3756057D0827}" type="datetimeFigureOut">
               <a:rPr lang="en-SG" smtClean="0"/>
-              <a:t>25/10/2012</a:t>
+              <a:t>10/11/2012</a:t>
             </a:fld>
             <a:endParaRPr lang="en-SG"/>
           </a:p>
@@ -2946,7 +2947,7 @@
           <a:p>
             <a:fld id="{6145E44A-13A4-430F-A4E2-3756057D0827}" type="datetimeFigureOut">
               <a:rPr lang="en-SG" smtClean="0"/>
-              <a:t>25/10/2012</a:t>
+              <a:t>10/11/2012</a:t>
             </a:fld>
             <a:endParaRPr lang="en-SG"/>
           </a:p>
@@ -3159,7 +3160,7 @@
           <a:p>
             <a:fld id="{6145E44A-13A4-430F-A4E2-3756057D0827}" type="datetimeFigureOut">
               <a:rPr lang="en-SG" smtClean="0"/>
-              <a:t>25/10/2012</a:t>
+              <a:t>10/11/2012</a:t>
             </a:fld>
             <a:endParaRPr lang="en-SG"/>
           </a:p>
@@ -3534,6 +3535,753 @@
           <a:chExt cx="0" cy="0"/>
         </a:xfrm>
       </p:grpSpPr>
+      <p:grpSp>
+        <p:nvGrpSpPr>
+          <p:cNvPr id="9" name="Group 8"/>
+          <p:cNvGrpSpPr/>
+          <p:nvPr/>
+        </p:nvGrpSpPr>
+        <p:grpSpPr>
+          <a:xfrm>
+            <a:off x="2081213" y="908720"/>
+            <a:ext cx="5659139" cy="4706164"/>
+            <a:chOff x="2081213" y="908720"/>
+            <a:chExt cx="5659139" cy="4706164"/>
+          </a:xfrm>
+        </p:grpSpPr>
+        <p:pic>
+          <p:nvPicPr>
+            <p:cNvPr id="1026" name="Picture 2" descr="C:\Users\Jenna\Desktop\Interface.gif"/>
+            <p:cNvPicPr>
+              <a:picLocks noChangeAspect="1" noChangeArrowheads="1"/>
+            </p:cNvPicPr>
+            <p:nvPr/>
+          </p:nvPicPr>
+          <p:blipFill>
+            <a:blip r:embed="rId2">
+              <a:extLst>
+                <a:ext uri="{28A0092B-C50C-407E-A947-70E740481C1C}">
+                  <a14:useLocalDpi xmlns:a14="http://schemas.microsoft.com/office/drawing/2010/main" val="0"/>
+                </a:ext>
+              </a:extLst>
+            </a:blip>
+            <a:srcRect/>
+            <a:stretch>
+              <a:fillRect/>
+            </a:stretch>
+          </p:blipFill>
+          <p:spPr bwMode="auto">
+            <a:xfrm>
+              <a:off x="2081213" y="1533525"/>
+              <a:ext cx="4981575" cy="3790950"/>
+            </a:xfrm>
+            <a:prstGeom prst="rect">
+              <a:avLst/>
+            </a:prstGeom>
+            <a:noFill/>
+            <a:extLst>
+              <a:ext uri="{909E8E84-426E-40DD-AFC4-6F175D3DCCD1}">
+                <a14:hiddenFill xmlns:a14="http://schemas.microsoft.com/office/drawing/2010/main">
+                  <a:solidFill>
+                    <a:srgbClr val="FFFFFF"/>
+                  </a:solidFill>
+                </a14:hiddenFill>
+              </a:ext>
+            </a:extLst>
+          </p:spPr>
+        </p:pic>
+        <p:sp>
+          <p:nvSpPr>
+            <p:cNvPr id="5" name="Line Callout 3 (Accent Bar) 4"/>
+            <p:cNvSpPr/>
+            <p:nvPr/>
+          </p:nvSpPr>
+          <p:spPr>
+            <a:xfrm>
+              <a:off x="3707904" y="4025784"/>
+              <a:ext cx="2154785" cy="392400"/>
+            </a:xfrm>
+            <a:prstGeom prst="accentCallout3">
+              <a:avLst>
+                <a:gd name="adj1" fmla="val 18750"/>
+                <a:gd name="adj2" fmla="val -3029"/>
+                <a:gd name="adj3" fmla="val 18750"/>
+                <a:gd name="adj4" fmla="val -11363"/>
+                <a:gd name="adj5" fmla="val 97573"/>
+                <a:gd name="adj6" fmla="val -11465"/>
+                <a:gd name="adj7" fmla="val 127527"/>
+                <a:gd name="adj8" fmla="val -4355"/>
+              </a:avLst>
+            </a:prstGeom>
+            <a:solidFill>
+              <a:schemeClr val="tx1">
+                <a:lumMod val="50000"/>
+                <a:lumOff val="50000"/>
+              </a:schemeClr>
+            </a:solidFill>
+            <a:ln w="12700">
+              <a:solidFill>
+                <a:schemeClr val="tx1">
+                  <a:lumMod val="50000"/>
+                  <a:lumOff val="50000"/>
+                </a:schemeClr>
+              </a:solidFill>
+            </a:ln>
+            <a:effectLst/>
+          </p:spPr>
+          <p:style>
+            <a:lnRef idx="2">
+              <a:schemeClr val="accent1">
+                <a:shade val="50000"/>
+              </a:schemeClr>
+            </a:lnRef>
+            <a:fillRef idx="1">
+              <a:schemeClr val="accent1"/>
+            </a:fillRef>
+            <a:effectRef idx="0">
+              <a:schemeClr val="accent1"/>
+            </a:effectRef>
+            <a:fontRef idx="minor">
+              <a:schemeClr val="lt1"/>
+            </a:fontRef>
+          </p:style>
+          <p:txBody>
+            <a:bodyPr rtlCol="0" anchor="ctr"/>
+            <a:lstStyle/>
+            <a:p>
+              <a:r>
+                <a:rPr lang="en-US" sz="1100" u="sng" dirty="0">
+                  <a:solidFill>
+                    <a:schemeClr val="bg1"/>
+                  </a:solidFill>
+                  <a:latin typeface="Arial" pitchFamily="34" charset="0"/>
+                  <a:ea typeface="Calibri"/>
+                  <a:cs typeface="Arial" pitchFamily="34" charset="0"/>
+                </a:rPr>
+                <a:t>Feedback box</a:t>
+              </a:r>
+              <a:r>
+                <a:rPr lang="en-US" sz="1100" dirty="0">
+                  <a:solidFill>
+                    <a:schemeClr val="bg1"/>
+                  </a:solidFill>
+                  <a:latin typeface="Arial" pitchFamily="34" charset="0"/>
+                  <a:ea typeface="Calibri"/>
+                  <a:cs typeface="Arial" pitchFamily="34" charset="0"/>
+                </a:rPr>
+                <a:t>: Where the feedback messages are output</a:t>
+              </a:r>
+              <a:endParaRPr lang="en-SG" sz="1100" dirty="0">
+                <a:solidFill>
+                  <a:schemeClr val="bg1"/>
+                </a:solidFill>
+                <a:latin typeface="Arial" pitchFamily="34" charset="0"/>
+                <a:ea typeface="Calibri"/>
+                <a:cs typeface="Arial" pitchFamily="34" charset="0"/>
+              </a:endParaRPr>
+            </a:p>
+          </p:txBody>
+        </p:sp>
+        <p:sp>
+          <p:nvSpPr>
+            <p:cNvPr id="11" name="Line Callout 3 (Accent Bar) 10"/>
+            <p:cNvSpPr/>
+            <p:nvPr/>
+          </p:nvSpPr>
+          <p:spPr>
+            <a:xfrm>
+              <a:off x="3347864" y="5373216"/>
+              <a:ext cx="3096344" cy="241668"/>
+            </a:xfrm>
+            <a:prstGeom prst="accentCallout3">
+              <a:avLst>
+                <a:gd name="adj1" fmla="val 86518"/>
+                <a:gd name="adj2" fmla="val -1519"/>
+                <a:gd name="adj3" fmla="val 87347"/>
+                <a:gd name="adj4" fmla="val -3670"/>
+                <a:gd name="adj5" fmla="val -6797"/>
+                <a:gd name="adj6" fmla="val -3512"/>
+                <a:gd name="adj7" fmla="val -85627"/>
+                <a:gd name="adj8" fmla="val -3464"/>
+              </a:avLst>
+            </a:prstGeom>
+            <a:solidFill>
+              <a:schemeClr val="bg1">
+                <a:lumMod val="50000"/>
+              </a:schemeClr>
+            </a:solidFill>
+            <a:ln w="12700">
+              <a:solidFill>
+                <a:schemeClr val="tx1">
+                  <a:lumMod val="50000"/>
+                  <a:lumOff val="50000"/>
+                </a:schemeClr>
+              </a:solidFill>
+            </a:ln>
+            <a:effectLst/>
+          </p:spPr>
+          <p:style>
+            <a:lnRef idx="2">
+              <a:schemeClr val="accent1">
+                <a:shade val="50000"/>
+              </a:schemeClr>
+            </a:lnRef>
+            <a:fillRef idx="1">
+              <a:schemeClr val="accent1"/>
+            </a:fillRef>
+            <a:effectRef idx="0">
+              <a:schemeClr val="accent1"/>
+            </a:effectRef>
+            <a:fontRef idx="minor">
+              <a:schemeClr val="lt1"/>
+            </a:fontRef>
+          </p:style>
+          <p:txBody>
+            <a:bodyPr rtlCol="0" anchor="ctr"/>
+            <a:lstStyle/>
+            <a:p>
+              <a:pPr algn="ctr"/>
+              <a:r>
+                <a:rPr lang="en-US" sz="1100" u="sng" dirty="0">
+                  <a:solidFill>
+                    <a:schemeClr val="bg1"/>
+                  </a:solidFill>
+                  <a:latin typeface="Arial" pitchFamily="34" charset="0"/>
+                  <a:cs typeface="Arial" pitchFamily="34" charset="0"/>
+                </a:rPr>
+                <a:t>Input box</a:t>
+              </a:r>
+              <a:r>
+                <a:rPr lang="en-US" sz="1100" dirty="0">
+                  <a:solidFill>
+                    <a:schemeClr val="bg1"/>
+                  </a:solidFill>
+                  <a:latin typeface="Arial" pitchFamily="34" charset="0"/>
+                  <a:cs typeface="Arial" pitchFamily="34" charset="0"/>
+                </a:rPr>
+                <a:t>: Where you enter your commands</a:t>
+              </a:r>
+              <a:endParaRPr lang="en-SG" sz="1100" dirty="0">
+                <a:solidFill>
+                  <a:schemeClr val="bg1"/>
+                </a:solidFill>
+                <a:latin typeface="Arial" pitchFamily="34" charset="0"/>
+                <a:cs typeface="Arial" pitchFamily="34" charset="0"/>
+              </a:endParaRPr>
+            </a:p>
+          </p:txBody>
+        </p:sp>
+        <p:sp>
+          <p:nvSpPr>
+            <p:cNvPr id="12" name="Line Callout 3 (Accent Bar) 11"/>
+            <p:cNvSpPr/>
+            <p:nvPr/>
+          </p:nvSpPr>
+          <p:spPr>
+            <a:xfrm flipH="1">
+              <a:off x="3171595" y="908720"/>
+              <a:ext cx="2448272" cy="576064"/>
+            </a:xfrm>
+            <a:prstGeom prst="accentCallout3">
+              <a:avLst>
+                <a:gd name="adj1" fmla="val 18750"/>
+                <a:gd name="adj2" fmla="val -1384"/>
+                <a:gd name="adj3" fmla="val 18750"/>
+                <a:gd name="adj4" fmla="val -6678"/>
+                <a:gd name="adj5" fmla="val 100000"/>
+                <a:gd name="adj6" fmla="val -6678"/>
+                <a:gd name="adj7" fmla="val 135560"/>
+                <a:gd name="adj8" fmla="val -6792"/>
+              </a:avLst>
+            </a:prstGeom>
+            <a:solidFill>
+              <a:schemeClr val="tx1">
+                <a:lumMod val="50000"/>
+                <a:lumOff val="50000"/>
+              </a:schemeClr>
+            </a:solidFill>
+            <a:ln w="12700">
+              <a:solidFill>
+                <a:schemeClr val="tx1">
+                  <a:lumMod val="50000"/>
+                  <a:lumOff val="50000"/>
+                </a:schemeClr>
+              </a:solidFill>
+            </a:ln>
+            <a:effectLst/>
+          </p:spPr>
+          <p:style>
+            <a:lnRef idx="2">
+              <a:schemeClr val="accent1">
+                <a:shade val="50000"/>
+              </a:schemeClr>
+            </a:lnRef>
+            <a:fillRef idx="1">
+              <a:schemeClr val="accent1"/>
+            </a:fillRef>
+            <a:effectRef idx="0">
+              <a:schemeClr val="accent1"/>
+            </a:effectRef>
+            <a:fontRef idx="minor">
+              <a:schemeClr val="lt1"/>
+            </a:fontRef>
+          </p:style>
+          <p:txBody>
+            <a:bodyPr rtlCol="0" anchor="ctr"/>
+            <a:lstStyle/>
+            <a:p>
+              <a:r>
+                <a:rPr lang="en-US" sz="1100" u="sng" dirty="0" smtClean="0">
+                  <a:solidFill>
+                    <a:schemeClr val="bg1"/>
+                  </a:solidFill>
+                  <a:latin typeface="Arial" pitchFamily="34" charset="0"/>
+                  <a:cs typeface="Arial" pitchFamily="34" charset="0"/>
+                </a:rPr>
+                <a:t>Settings/Preferences</a:t>
+              </a:r>
+              <a:r>
+                <a:rPr lang="en-US" sz="1100" dirty="0" smtClean="0">
+                  <a:solidFill>
+                    <a:schemeClr val="bg1"/>
+                  </a:solidFill>
+                  <a:latin typeface="Arial" pitchFamily="34" charset="0"/>
+                  <a:cs typeface="Arial" pitchFamily="34" charset="0"/>
+                </a:rPr>
+                <a:t>: Where you customize your command keywords, startup settings and more</a:t>
+              </a:r>
+              <a:endParaRPr lang="en-SG" sz="1100" dirty="0">
+                <a:solidFill>
+                  <a:schemeClr val="bg1"/>
+                </a:solidFill>
+                <a:latin typeface="Arial" pitchFamily="34" charset="0"/>
+                <a:cs typeface="Arial" pitchFamily="34" charset="0"/>
+              </a:endParaRPr>
+            </a:p>
+          </p:txBody>
+        </p:sp>
+        <p:sp>
+          <p:nvSpPr>
+            <p:cNvPr id="14" name="Line Callout 3 (Accent Bar) 13"/>
+            <p:cNvSpPr/>
+            <p:nvPr/>
+          </p:nvSpPr>
+          <p:spPr>
+            <a:xfrm>
+              <a:off x="5436096" y="1916832"/>
+              <a:ext cx="713568" cy="241668"/>
+            </a:xfrm>
+            <a:prstGeom prst="accentCallout3">
+              <a:avLst>
+                <a:gd name="adj1" fmla="val 86518"/>
+                <a:gd name="adj2" fmla="val -3422"/>
+                <a:gd name="adj3" fmla="val 87025"/>
+                <a:gd name="adj4" fmla="val -8712"/>
+                <a:gd name="adj5" fmla="val -6526"/>
+                <a:gd name="adj6" fmla="val -8691"/>
+                <a:gd name="adj7" fmla="val -74021"/>
+                <a:gd name="adj8" fmla="val -8967"/>
+              </a:avLst>
+            </a:prstGeom>
+            <a:solidFill>
+              <a:schemeClr val="bg1">
+                <a:lumMod val="50000"/>
+              </a:schemeClr>
+            </a:solidFill>
+            <a:ln w="12700">
+              <a:solidFill>
+                <a:schemeClr val="tx1">
+                  <a:lumMod val="50000"/>
+                  <a:lumOff val="50000"/>
+                </a:schemeClr>
+              </a:solidFill>
+            </a:ln>
+            <a:effectLst/>
+          </p:spPr>
+          <p:style>
+            <a:lnRef idx="2">
+              <a:schemeClr val="accent1">
+                <a:shade val="50000"/>
+              </a:schemeClr>
+            </a:lnRef>
+            <a:fillRef idx="1">
+              <a:schemeClr val="accent1"/>
+            </a:fillRef>
+            <a:effectRef idx="0">
+              <a:schemeClr val="accent1"/>
+            </a:effectRef>
+            <a:fontRef idx="minor">
+              <a:schemeClr val="lt1"/>
+            </a:fontRef>
+          </p:style>
+          <p:txBody>
+            <a:bodyPr rtlCol="0" anchor="ctr"/>
+            <a:lstStyle/>
+            <a:p>
+              <a:pPr algn="ctr"/>
+              <a:r>
+                <a:rPr lang="en-US" sz="1100" u="sng" dirty="0" smtClean="0">
+                  <a:solidFill>
+                    <a:schemeClr val="bg1"/>
+                  </a:solidFill>
+                  <a:latin typeface="Arial" pitchFamily="34" charset="0"/>
+                  <a:cs typeface="Arial" pitchFamily="34" charset="0"/>
+                </a:rPr>
+                <a:t>Help</a:t>
+              </a:r>
+              <a:endParaRPr lang="en-SG" sz="1100" dirty="0">
+                <a:solidFill>
+                  <a:schemeClr val="bg1"/>
+                </a:solidFill>
+                <a:latin typeface="Arial" pitchFamily="34" charset="0"/>
+                <a:cs typeface="Arial" pitchFamily="34" charset="0"/>
+              </a:endParaRPr>
+            </a:p>
+          </p:txBody>
+        </p:sp>
+        <p:sp>
+          <p:nvSpPr>
+            <p:cNvPr id="16" name="Line Callout 3 (Accent Bar) 15"/>
+            <p:cNvSpPr/>
+            <p:nvPr/>
+          </p:nvSpPr>
+          <p:spPr>
+            <a:xfrm flipH="1">
+              <a:off x="5825628" y="1052736"/>
+              <a:ext cx="1194644" cy="392400"/>
+            </a:xfrm>
+            <a:prstGeom prst="accentCallout3">
+              <a:avLst>
+                <a:gd name="adj1" fmla="val 18750"/>
+                <a:gd name="adj2" fmla="val -3709"/>
+                <a:gd name="adj3" fmla="val 18750"/>
+                <a:gd name="adj4" fmla="val -6678"/>
+                <a:gd name="adj5" fmla="val 100000"/>
+                <a:gd name="adj6" fmla="val -6678"/>
+                <a:gd name="adj7" fmla="val 146165"/>
+                <a:gd name="adj8" fmla="val 19074"/>
+              </a:avLst>
+            </a:prstGeom>
+            <a:solidFill>
+              <a:schemeClr val="tx1">
+                <a:lumMod val="50000"/>
+                <a:lumOff val="50000"/>
+              </a:schemeClr>
+            </a:solidFill>
+            <a:ln w="12700">
+              <a:solidFill>
+                <a:schemeClr val="tx1">
+                  <a:lumMod val="50000"/>
+                  <a:lumOff val="50000"/>
+                </a:schemeClr>
+              </a:solidFill>
+            </a:ln>
+            <a:effectLst/>
+          </p:spPr>
+          <p:style>
+            <a:lnRef idx="2">
+              <a:schemeClr val="accent1">
+                <a:shade val="50000"/>
+              </a:schemeClr>
+            </a:lnRef>
+            <a:fillRef idx="1">
+              <a:schemeClr val="accent1"/>
+            </a:fillRef>
+            <a:effectRef idx="0">
+              <a:schemeClr val="accent1"/>
+            </a:effectRef>
+            <a:fontRef idx="minor">
+              <a:schemeClr val="lt1"/>
+            </a:fontRef>
+          </p:style>
+          <p:txBody>
+            <a:bodyPr rtlCol="0" anchor="ctr"/>
+            <a:lstStyle/>
+            <a:p>
+              <a:r>
+                <a:rPr lang="en-US" sz="1100" dirty="0" smtClean="0">
+                  <a:solidFill>
+                    <a:schemeClr val="bg1"/>
+                  </a:solidFill>
+                  <a:latin typeface="Arial" pitchFamily="34" charset="0"/>
+                  <a:cs typeface="Arial" pitchFamily="34" charset="0"/>
+                </a:rPr>
+                <a:t>Exit: Click this to quit </a:t>
+              </a:r>
+              <a:r>
+                <a:rPr lang="en-US" sz="1100" dirty="0" err="1" smtClean="0">
+                  <a:solidFill>
+                    <a:schemeClr val="bg1"/>
+                  </a:solidFill>
+                  <a:latin typeface="Arial" pitchFamily="34" charset="0"/>
+                  <a:cs typeface="Arial" pitchFamily="34" charset="0"/>
+                </a:rPr>
+                <a:t>Todo</a:t>
+              </a:r>
+              <a:r>
+                <a:rPr lang="en-US" sz="1100" dirty="0" smtClean="0">
+                  <a:solidFill>
+                    <a:schemeClr val="bg1"/>
+                  </a:solidFill>
+                  <a:latin typeface="Arial" pitchFamily="34" charset="0"/>
+                  <a:cs typeface="Arial" pitchFamily="34" charset="0"/>
+                </a:rPr>
+                <a:t>++</a:t>
+              </a:r>
+              <a:endParaRPr lang="en-SG" sz="1100" dirty="0">
+                <a:solidFill>
+                  <a:schemeClr val="bg1"/>
+                </a:solidFill>
+                <a:latin typeface="Arial" pitchFamily="34" charset="0"/>
+                <a:cs typeface="Arial" pitchFamily="34" charset="0"/>
+              </a:endParaRPr>
+            </a:p>
+          </p:txBody>
+        </p:sp>
+        <p:sp>
+          <p:nvSpPr>
+            <p:cNvPr id="18" name="Line Callout 3 (Accent Bar) 17"/>
+            <p:cNvSpPr/>
+            <p:nvPr/>
+          </p:nvSpPr>
+          <p:spPr>
+            <a:xfrm flipH="1">
+              <a:off x="4283968" y="2276872"/>
+              <a:ext cx="1922950" cy="392400"/>
+            </a:xfrm>
+            <a:prstGeom prst="accentCallout3">
+              <a:avLst>
+                <a:gd name="adj1" fmla="val 86518"/>
+                <a:gd name="adj2" fmla="val -1519"/>
+                <a:gd name="adj3" fmla="val 87347"/>
+                <a:gd name="adj4" fmla="val -3670"/>
+                <a:gd name="adj5" fmla="val -6797"/>
+                <a:gd name="adj6" fmla="val -3512"/>
+                <a:gd name="adj7" fmla="val -145281"/>
+                <a:gd name="adj8" fmla="val -3464"/>
+              </a:avLst>
+            </a:prstGeom>
+            <a:solidFill>
+              <a:schemeClr val="bg1">
+                <a:lumMod val="50000"/>
+              </a:schemeClr>
+            </a:solidFill>
+            <a:ln w="12700">
+              <a:solidFill>
+                <a:schemeClr val="tx1">
+                  <a:lumMod val="50000"/>
+                  <a:lumOff val="50000"/>
+                </a:schemeClr>
+              </a:solidFill>
+            </a:ln>
+            <a:effectLst/>
+          </p:spPr>
+          <p:style>
+            <a:lnRef idx="2">
+              <a:schemeClr val="accent1">
+                <a:shade val="50000"/>
+              </a:schemeClr>
+            </a:lnRef>
+            <a:fillRef idx="1">
+              <a:schemeClr val="accent1"/>
+            </a:fillRef>
+            <a:effectRef idx="0">
+              <a:schemeClr val="accent1"/>
+            </a:effectRef>
+            <a:fontRef idx="minor">
+              <a:schemeClr val="lt1"/>
+            </a:fontRef>
+          </p:style>
+          <p:txBody>
+            <a:bodyPr rtlCol="0" anchor="ctr"/>
+            <a:lstStyle/>
+            <a:p>
+              <a:r>
+                <a:rPr lang="en-US" sz="1100" u="sng" smtClean="0">
+                  <a:solidFill>
+                    <a:schemeClr val="bg1"/>
+                  </a:solidFill>
+                  <a:latin typeface="Arial" pitchFamily="34" charset="0"/>
+                  <a:cs typeface="Arial" pitchFamily="34" charset="0"/>
+                </a:rPr>
+                <a:t>Collapser</a:t>
+              </a:r>
+              <a:r>
+                <a:rPr lang="en-US" sz="1100" smtClean="0">
+                  <a:solidFill>
+                    <a:schemeClr val="bg1"/>
+                  </a:solidFill>
+                  <a:latin typeface="Arial" pitchFamily="34" charset="0"/>
+                  <a:cs typeface="Arial" pitchFamily="34" charset="0"/>
+                </a:rPr>
+                <a:t>: </a:t>
+              </a:r>
+              <a:r>
+                <a:rPr lang="en-US" sz="1100" dirty="0" smtClean="0">
+                  <a:solidFill>
+                    <a:schemeClr val="bg1"/>
+                  </a:solidFill>
+                  <a:latin typeface="Arial" pitchFamily="34" charset="0"/>
+                  <a:cs typeface="Arial" pitchFamily="34" charset="0"/>
+                </a:rPr>
+                <a:t>Click this to hide and show the feedback box</a:t>
+              </a:r>
+              <a:endParaRPr lang="en-SG" sz="1100" dirty="0">
+                <a:solidFill>
+                  <a:schemeClr val="bg1"/>
+                </a:solidFill>
+                <a:latin typeface="Arial" pitchFamily="34" charset="0"/>
+                <a:cs typeface="Arial" pitchFamily="34" charset="0"/>
+              </a:endParaRPr>
+            </a:p>
+          </p:txBody>
+        </p:sp>
+        <p:sp>
+          <p:nvSpPr>
+            <p:cNvPr id="21" name="Line Callout 3 (Accent Bar) 20"/>
+            <p:cNvSpPr/>
+            <p:nvPr/>
+          </p:nvSpPr>
+          <p:spPr>
+            <a:xfrm>
+              <a:off x="6444208" y="1860726"/>
+              <a:ext cx="1296144" cy="391844"/>
+            </a:xfrm>
+            <a:prstGeom prst="accentCallout3">
+              <a:avLst>
+                <a:gd name="adj1" fmla="val 86518"/>
+                <a:gd name="adj2" fmla="val -1519"/>
+                <a:gd name="adj3" fmla="val 87347"/>
+                <a:gd name="adj4" fmla="val -3670"/>
+                <a:gd name="adj5" fmla="val -6797"/>
+                <a:gd name="adj6" fmla="val -3512"/>
+                <a:gd name="adj7" fmla="val -33649"/>
+                <a:gd name="adj8" fmla="val -3244"/>
+              </a:avLst>
+            </a:prstGeom>
+            <a:solidFill>
+              <a:schemeClr val="bg1">
+                <a:lumMod val="50000"/>
+              </a:schemeClr>
+            </a:solidFill>
+            <a:ln w="12700">
+              <a:solidFill>
+                <a:schemeClr val="tx1">
+                  <a:lumMod val="50000"/>
+                  <a:lumOff val="50000"/>
+                </a:schemeClr>
+              </a:solidFill>
+            </a:ln>
+            <a:effectLst/>
+          </p:spPr>
+          <p:style>
+            <a:lnRef idx="2">
+              <a:schemeClr val="accent1">
+                <a:shade val="50000"/>
+              </a:schemeClr>
+            </a:lnRef>
+            <a:fillRef idx="1">
+              <a:schemeClr val="accent1"/>
+            </a:fillRef>
+            <a:effectRef idx="0">
+              <a:schemeClr val="accent1"/>
+            </a:effectRef>
+            <a:fontRef idx="minor">
+              <a:schemeClr val="lt1"/>
+            </a:fontRef>
+          </p:style>
+          <p:txBody>
+            <a:bodyPr rtlCol="0" anchor="ctr"/>
+            <a:lstStyle/>
+            <a:p>
+              <a:r>
+                <a:rPr lang="en-US" sz="1100" u="sng" dirty="0">
+                  <a:solidFill>
+                    <a:schemeClr val="bg1"/>
+                  </a:solidFill>
+                  <a:latin typeface="Arial" pitchFamily="34" charset="0"/>
+                  <a:cs typeface="Arial" pitchFamily="34" charset="0"/>
+                </a:rPr>
+                <a:t>Hide</a:t>
+              </a:r>
+              <a:r>
+                <a:rPr lang="en-US" sz="1100" dirty="0">
+                  <a:solidFill>
+                    <a:schemeClr val="bg1"/>
+                  </a:solidFill>
+                  <a:latin typeface="Arial" pitchFamily="34" charset="0"/>
+                  <a:cs typeface="Arial" pitchFamily="34" charset="0"/>
+                </a:rPr>
+                <a:t>: Click this to minimize </a:t>
+              </a:r>
+              <a:r>
+                <a:rPr lang="en-US" sz="1100" dirty="0" err="1">
+                  <a:solidFill>
+                    <a:schemeClr val="bg1"/>
+                  </a:solidFill>
+                  <a:latin typeface="Arial" pitchFamily="34" charset="0"/>
+                  <a:cs typeface="Arial" pitchFamily="34" charset="0"/>
+                </a:rPr>
+                <a:t>ToDo</a:t>
+              </a:r>
+              <a:r>
+                <a:rPr lang="en-US" sz="1100" dirty="0">
+                  <a:solidFill>
+                    <a:schemeClr val="bg1"/>
+                  </a:solidFill>
+                  <a:latin typeface="Arial" pitchFamily="34" charset="0"/>
+                  <a:cs typeface="Arial" pitchFamily="34" charset="0"/>
+                </a:rPr>
+                <a:t>++</a:t>
+              </a:r>
+              <a:endParaRPr lang="en-SG" sz="1100" dirty="0">
+                <a:solidFill>
+                  <a:schemeClr val="bg1"/>
+                </a:solidFill>
+                <a:latin typeface="Arial" pitchFamily="34" charset="0"/>
+                <a:cs typeface="Arial" pitchFamily="34" charset="0"/>
+              </a:endParaRPr>
+            </a:p>
+          </p:txBody>
+        </p:sp>
+      </p:grpSp>
+    </p:spTree>
+    <p:extLst>
+      <p:ext uri="{BB962C8B-B14F-4D97-AF65-F5344CB8AC3E}">
+        <p14:creationId xmlns:p14="http://schemas.microsoft.com/office/powerpoint/2010/main" val="2203563615"/>
+      </p:ext>
+    </p:extLst>
+  </p:cSld>
+  <p:clrMapOvr>
+    <a:masterClrMapping/>
+  </p:clrMapOvr>
+  <p:timing>
+    <p:tnLst>
+      <p:par>
+        <p:cTn id="1" dur="indefinite" restart="never" nodeType="tmRoot"/>
+      </p:par>
+    </p:tnLst>
+  </p:timing>
+</p:sld>
+</file>
+
+<file path=ppt/slides/slide2.xml><?xml version="1.0" encoding="utf-8"?>
+<p:sld xmlns:a="http://schemas.openxmlformats.org/drawingml/2006/main" xmlns:r="http://schemas.openxmlformats.org/officeDocument/2006/relationships" xmlns:p="http://schemas.openxmlformats.org/presentationml/2006/main">
+  <p:cSld>
+    <p:spTree>
+      <p:nvGrpSpPr>
+        <p:cNvPr id="1" name=""/>
+        <p:cNvGrpSpPr/>
+        <p:nvPr/>
+      </p:nvGrpSpPr>
+      <p:grpSpPr>
+        <a:xfrm>
+          <a:off x="0" y="0"/>
+          <a:ext cx="0" cy="0"/>
+          <a:chOff x="0" y="0"/>
+          <a:chExt cx="0" cy="0"/>
+        </a:xfrm>
+      </p:grpSpPr>
       <p:pic>
         <p:nvPicPr>
           <p:cNvPr id="1027" name="Picture 3"/>
@@ -3833,17 +4581,7 @@
                 <a:latin typeface="Arial" pitchFamily="34" charset="0"/>
                 <a:cs typeface="Arial" pitchFamily="34" charset="0"/>
               </a:rPr>
-              <a:t>: </a:t>
-            </a:r>
-            <a:r>
-              <a:rPr lang="en-US" sz="1100" dirty="0" smtClean="0">
-                <a:solidFill>
-                  <a:schemeClr val="tx1"/>
-                </a:solidFill>
-                <a:latin typeface="Arial" pitchFamily="34" charset="0"/>
-                <a:cs typeface="Arial" pitchFamily="34" charset="0"/>
-              </a:rPr>
-              <a:t>Where you customize your keyboard shortcuts, command keywords and more</a:t>
+              <a:t>: Where you customize your keyboard shortcuts, command keywords and more</a:t>
             </a:r>
             <a:endParaRPr lang="en-SG" sz="1100" dirty="0">
               <a:solidFill>
@@ -3956,7 +4694,7 @@
 </p:sld>
 </file>
 
-<file path=ppt/slides/slide2.xml><?xml version="1.0" encoding="utf-8"?>
+<file path=ppt/slides/slide3.xml><?xml version="1.0" encoding="utf-8"?>
 <p:sld xmlns:a="http://schemas.openxmlformats.org/drawingml/2006/main" xmlns:r="http://schemas.openxmlformats.org/officeDocument/2006/relationships" xmlns:p="http://schemas.openxmlformats.org/presentationml/2006/main">
   <p:cSld>
     <p:spTree>
@@ -4713,7 +5451,7 @@
 </p:sld>
 </file>
 
-<file path=ppt/slides/slide3.xml><?xml version="1.0" encoding="utf-8"?>
+<file path=ppt/slides/slide4.xml><?xml version="1.0" encoding="utf-8"?>
 <p:sld xmlns:a="http://schemas.openxmlformats.org/drawingml/2006/main" xmlns:r="http://schemas.openxmlformats.org/officeDocument/2006/relationships" xmlns:p="http://schemas.openxmlformats.org/presentationml/2006/main">
   <p:cSld>
     <p:spTree>

</xml_diff>